<commit_message>
update 20190622 - 4
</commit_message>
<xml_diff>
--- a/Movie Collector Prj Presentation.pptx
+++ b/Movie Collector Prj Presentation.pptx
@@ -110,6 +110,11 @@
       </a:defRPr>
     </a:lvl9pPr>
   </p:defaultTextStyle>
+  <p:extLst>
+    <p:ext uri="{EFAFB233-063F-42B5-8137-9DF3F51BA10A}">
+      <p15:sldGuideLst xmlns:p15="http://schemas.microsoft.com/office/powerpoint/2012/main"/>
+    </p:ext>
+  </p:extLst>
 </p:presentation>
 </file>
 
@@ -14226,6 +14231,36 @@
           <a:chExt cx="0" cy="0"/>
         </a:xfrm>
       </p:grpSpPr>
+      <p:pic>
+        <p:nvPicPr>
+          <p:cNvPr id="5" name="Picture 4">
+            <a:extLst>
+              <a:ext uri="{FF2B5EF4-FFF2-40B4-BE49-F238E27FC236}">
+                <a16:creationId xmlns:a16="http://schemas.microsoft.com/office/drawing/2014/main" id="{CB5BA7F5-5A49-4FD6-B45D-70CCE9A3692D}"/>
+              </a:ext>
+            </a:extLst>
+          </p:cNvPr>
+          <p:cNvPicPr>
+            <a:picLocks noChangeAspect="1"/>
+          </p:cNvPicPr>
+          <p:nvPr/>
+        </p:nvPicPr>
+        <p:blipFill>
+          <a:blip r:embed="rId2"/>
+          <a:stretch>
+            <a:fillRect/>
+          </a:stretch>
+        </p:blipFill>
+        <p:spPr>
+          <a:xfrm>
+            <a:off x="4445244" y="1870264"/>
+            <a:ext cx="7224060" cy="4465783"/>
+          </a:xfrm>
+          <a:prstGeom prst="rect">
+            <a:avLst/>
+          </a:prstGeom>
+        </p:spPr>
+      </p:pic>
       <p:sp>
         <p:nvSpPr>
           <p:cNvPr id="2" name="Title 1">
@@ -14242,7 +14277,12 @@
             <p:ph type="ctrTitle"/>
           </p:nvPr>
         </p:nvSpPr>
-        <p:spPr/>
+        <p:spPr>
+          <a:xfrm>
+            <a:off x="1119528" y="1173016"/>
+            <a:ext cx="8825658" cy="755971"/>
+          </a:xfrm>
+        </p:spPr>
         <p:txBody>
           <a:bodyPr/>
           <a:lstStyle/>
@@ -14983,6 +15023,27 @@
             <a:r>
               <a:rPr lang="en-US" dirty="0"/>
               <a:t>)</a:t>
+            </a:r>
+          </a:p>
+          <a:p>
+            <a:endParaRPr lang="en-US" dirty="0"/>
+          </a:p>
+          <a:p>
+            <a:r>
+              <a:rPr lang="en-US" b="1" dirty="0"/>
+              <a:t>Future features</a:t>
+            </a:r>
+            <a:r>
+              <a:rPr lang="en-US" dirty="0"/>
+              <a:t>: </a:t>
+            </a:r>
+            <a:r>
+              <a:rPr lang="en-US" dirty="0">
+                <a:solidFill>
+                  <a:srgbClr val="339933"/>
+                </a:solidFill>
+              </a:rPr>
+              <a:t>Capability to upload from a file or reading directly from a storage device</a:t>
             </a:r>
           </a:p>
         </p:txBody>

</xml_diff>